<commit_message>
Update DATOS COVID Chile 2022 04 09.pptx
</commit_message>
<xml_diff>
--- a/DATOS COVID Chile 2022 04 09.pptx
+++ b/DATOS COVID Chile 2022 04 09.pptx
@@ -5982,10 +5982,10 @@
       </p:sp>
       <p:pic>
         <p:nvPicPr>
-          <p:cNvPr id="3" name="Picture 2" descr="Chart, bar chart&#10;&#10;Description automatically generated">
-            <a:extLst>
-              <a:ext uri="{FF2B5EF4-FFF2-40B4-BE49-F238E27FC236}">
-                <a16:creationId xmlns:a16="http://schemas.microsoft.com/office/drawing/2014/main" id="{A40A444A-CC65-1640-915E-1FF1F6D1C3E2}"/>
+          <p:cNvPr id="8" name="Picture 7" descr="Chart, bar chart&#10;&#10;Description automatically generated">
+            <a:extLst>
+              <a:ext uri="{FF2B5EF4-FFF2-40B4-BE49-F238E27FC236}">
+                <a16:creationId xmlns:a16="http://schemas.microsoft.com/office/drawing/2014/main" id="{7BE2113B-262C-D24D-A083-F8600576BB2B}"/>
               </a:ext>
             </a:extLst>
           </p:cNvPr>
@@ -6002,8 +6002,8 @@
         </p:blipFill>
         <p:spPr>
           <a:xfrm>
-            <a:off x="783771" y="720097"/>
-            <a:ext cx="11146971" cy="5748203"/>
+            <a:off x="1053192" y="887283"/>
+            <a:ext cx="10085614" cy="5394150"/>
           </a:xfrm>
           <a:prstGeom prst="rect">
             <a:avLst/>

</xml_diff>